<commit_message>
Switched CO2 Emission Graphs
</commit_message>
<xml_diff>
--- a/20190729 Energizers_Project_1_Presentation.v2.pptx
+++ b/20190729 Energizers_Project_1_Presentation.v2.pptx
@@ -367,7 +367,7 @@
             <a:fld id="{5586B75A-687E-405C-8A0B-8D00578BA2C3}" type="datetimeFigureOut">
               <a:rPr lang="en-US" dirty="0"/>
               <a:pPr/>
-              <a:t>7/28/2019</a:t>
+              <a:t>7/29/2019</a:t>
             </a:fld>
             <a:endParaRPr lang="en-US" dirty="0"/>
           </a:p>
@@ -534,7 +534,7 @@
             <a:fld id="{5586B75A-687E-405C-8A0B-8D00578BA2C3}" type="datetimeFigureOut">
               <a:rPr lang="en-US" dirty="0"/>
               <a:pPr/>
-              <a:t>7/28/2019</a:t>
+              <a:t>7/29/2019</a:t>
             </a:fld>
             <a:endParaRPr lang="en-US" dirty="0"/>
           </a:p>
@@ -711,7 +711,7 @@
             <a:fld id="{5586B75A-687E-405C-8A0B-8D00578BA2C3}" type="datetimeFigureOut">
               <a:rPr lang="en-US" dirty="0"/>
               <a:pPr/>
-              <a:t>7/28/2019</a:t>
+              <a:t>7/29/2019</a:t>
             </a:fld>
             <a:endParaRPr lang="en-US" dirty="0"/>
           </a:p>
@@ -878,7 +878,7 @@
             <a:fld id="{5586B75A-687E-405C-8A0B-8D00578BA2C3}" type="datetimeFigureOut">
               <a:rPr lang="en-US" dirty="0"/>
               <a:pPr/>
-              <a:t>7/28/2019</a:t>
+              <a:t>7/29/2019</a:t>
             </a:fld>
             <a:endParaRPr lang="en-US" dirty="0"/>
           </a:p>
@@ -1133,7 +1133,7 @@
             <a:fld id="{5586B75A-687E-405C-8A0B-8D00578BA2C3}" type="datetimeFigureOut">
               <a:rPr lang="en-US" dirty="0"/>
               <a:pPr/>
-              <a:t>7/28/2019</a:t>
+              <a:t>7/29/2019</a:t>
             </a:fld>
             <a:endParaRPr lang="en-US" dirty="0"/>
           </a:p>
@@ -1418,7 +1418,7 @@
             <a:fld id="{5586B75A-687E-405C-8A0B-8D00578BA2C3}" type="datetimeFigureOut">
               <a:rPr lang="en-US" dirty="0"/>
               <a:pPr/>
-              <a:t>7/28/2019</a:t>
+              <a:t>7/29/2019</a:t>
             </a:fld>
             <a:endParaRPr lang="en-US" dirty="0"/>
           </a:p>
@@ -1857,7 +1857,7 @@
             <a:fld id="{5586B75A-687E-405C-8A0B-8D00578BA2C3}" type="datetimeFigureOut">
               <a:rPr lang="en-US" dirty="0"/>
               <a:pPr/>
-              <a:t>7/28/2019</a:t>
+              <a:t>7/29/2019</a:t>
             </a:fld>
             <a:endParaRPr lang="en-US" dirty="0"/>
           </a:p>
@@ -1972,7 +1972,7 @@
             <a:fld id="{5586B75A-687E-405C-8A0B-8D00578BA2C3}" type="datetimeFigureOut">
               <a:rPr lang="en-US" dirty="0"/>
               <a:pPr/>
-              <a:t>7/28/2019</a:t>
+              <a:t>7/29/2019</a:t>
             </a:fld>
             <a:endParaRPr lang="en-US" dirty="0"/>
           </a:p>
@@ -2064,7 +2064,7 @@
             <a:fld id="{5586B75A-687E-405C-8A0B-8D00578BA2C3}" type="datetimeFigureOut">
               <a:rPr lang="en-US" dirty="0"/>
               <a:pPr/>
-              <a:t>7/28/2019</a:t>
+              <a:t>7/29/2019</a:t>
             </a:fld>
             <a:endParaRPr lang="en-US" dirty="0"/>
           </a:p>
@@ -2349,7 +2349,7 @@
             <a:fld id="{5586B75A-687E-405C-8A0B-8D00578BA2C3}" type="datetimeFigureOut">
               <a:rPr lang="en-US" dirty="0"/>
               <a:pPr/>
-              <a:t>7/28/2019</a:t>
+              <a:t>7/29/2019</a:t>
             </a:fld>
             <a:endParaRPr lang="en-US" dirty="0"/>
           </a:p>
@@ -2619,7 +2619,7 @@
             <a:fld id="{5586B75A-687E-405C-8A0B-8D00578BA2C3}" type="datetimeFigureOut">
               <a:rPr lang="en-US" dirty="0"/>
               <a:pPr/>
-              <a:t>7/28/2019</a:t>
+              <a:t>7/29/2019</a:t>
             </a:fld>
             <a:endParaRPr lang="en-US" dirty="0"/>
           </a:p>
@@ -2913,7 +2913,7 @@
             <a:fld id="{5586B75A-687E-405C-8A0B-8D00578BA2C3}" type="datetimeFigureOut">
               <a:rPr lang="en-US" dirty="0"/>
               <a:pPr/>
-              <a:t>7/28/2019</a:t>
+              <a:t>7/29/2019</a:t>
             </a:fld>
             <a:endParaRPr lang="en-US" dirty="0"/>
           </a:p>
@@ -4026,41 +4026,31 @@
       </p:sp>
       <p:pic>
         <p:nvPicPr>
-          <p:cNvPr id="7" name="Content Placeholder 6" descr="CO2EmissionBySectorTL">
+          <p:cNvPr id="6" name="Content Placeholder 5">
             <a:extLst>
               <a:ext uri="{FF2B5EF4-FFF2-40B4-BE49-F238E27FC236}">
-                <a16:creationId xmlns:a16="http://schemas.microsoft.com/office/drawing/2014/main" id="{713551F1-DCDE-434F-B374-E5DBD14619F9}"/>
+                <a16:creationId xmlns:a16="http://schemas.microsoft.com/office/drawing/2014/main" id="{D34A8923-D02F-4353-8C41-28976B3B4915}"/>
               </a:ext>
             </a:extLst>
           </p:cNvPr>
           <p:cNvPicPr>
             <a:picLocks noGrp="1" noChangeAspect="1"/>
           </p:cNvPicPr>
-          <p:nvPr isPhoto="1">
+          <p:nvPr>
             <p:ph idx="1"/>
           </p:nvPr>
         </p:nvPicPr>
         <p:blipFill>
-          <a:blip r:embed="rId2">
-            <a:lum/>
-            <a:extLst>
-              <a:ext uri="{28A0092B-C50C-407E-A947-70E740481C1C}">
-                <a14:useLocalDpi xmlns:a14="http://schemas.microsoft.com/office/drawing/2010/main" val="0"/>
-              </a:ext>
-            </a:extLst>
-          </a:blip>
+          <a:blip r:embed="rId2"/>
           <a:stretch>
             <a:fillRect/>
           </a:stretch>
         </p:blipFill>
         <p:spPr>
           <a:xfrm>
-            <a:off x="3566895" y="1229488"/>
-            <a:ext cx="8056285" cy="4833770"/>
+            <a:off x="3868738" y="1229678"/>
+            <a:ext cx="7315200" cy="4389119"/>
           </a:xfrm>
-          <a:prstGeom prst="rect">
-            <a:avLst/>
-          </a:prstGeom>
         </p:spPr>
       </p:pic>
     </p:spTree>
@@ -4188,41 +4178,31 @@
       </p:sp>
       <p:pic>
         <p:nvPicPr>
-          <p:cNvPr id="4" name="Content Placeholder 3" descr="CO2EmissionSourcesVsSectors">
+          <p:cNvPr id="7" name="Content Placeholder 6">
             <a:extLst>
               <a:ext uri="{FF2B5EF4-FFF2-40B4-BE49-F238E27FC236}">
-                <a16:creationId xmlns:a16="http://schemas.microsoft.com/office/drawing/2014/main" id="{58E42144-D23D-4CE5-BD9F-831F7E2C43B4}"/>
+                <a16:creationId xmlns:a16="http://schemas.microsoft.com/office/drawing/2014/main" id="{CFFBFC83-BA92-4594-890D-538F6E5B8B71}"/>
               </a:ext>
             </a:extLst>
           </p:cNvPr>
           <p:cNvPicPr>
             <a:picLocks noGrp="1" noChangeAspect="1"/>
           </p:cNvPicPr>
-          <p:nvPr isPhoto="1">
+          <p:nvPr>
             <p:ph idx="1"/>
           </p:nvPr>
         </p:nvPicPr>
         <p:blipFill>
-          <a:blip r:embed="rId2">
-            <a:lum/>
-            <a:extLst>
-              <a:ext uri="{28A0092B-C50C-407E-A947-70E740481C1C}">
-                <a14:useLocalDpi xmlns:a14="http://schemas.microsoft.com/office/drawing/2010/main" val="0"/>
-              </a:ext>
-            </a:extLst>
-          </a:blip>
+          <a:blip r:embed="rId2"/>
           <a:stretch>
             <a:fillRect/>
           </a:stretch>
         </p:blipFill>
         <p:spPr>
           <a:xfrm>
-            <a:off x="3593529" y="1123837"/>
-            <a:ext cx="7885298" cy="4731178"/>
+            <a:off x="3868738" y="1229678"/>
+            <a:ext cx="7315200" cy="4389119"/>
           </a:xfrm>
-          <a:prstGeom prst="rect">
-            <a:avLst/>
-          </a:prstGeom>
         </p:spPr>
       </p:pic>
     </p:spTree>

</xml_diff>

<commit_message>
Fix Color for Sector Graph
</commit_message>
<xml_diff>
--- a/20190729 Energizers_Project_1_Presentation.v2.pptx
+++ b/20190729 Energizers_Project_1_Presentation.v2.pptx
@@ -4026,10 +4026,10 @@
       </p:sp>
       <p:pic>
         <p:nvPicPr>
-          <p:cNvPr id="6" name="Content Placeholder 5">
+          <p:cNvPr id="7" name="Content Placeholder 6">
             <a:extLst>
               <a:ext uri="{FF2B5EF4-FFF2-40B4-BE49-F238E27FC236}">
-                <a16:creationId xmlns:a16="http://schemas.microsoft.com/office/drawing/2014/main" id="{D34A8923-D02F-4353-8C41-28976B3B4915}"/>
+                <a16:creationId xmlns:a16="http://schemas.microsoft.com/office/drawing/2014/main" id="{CFCF75FA-521A-4945-A02C-12DB78F82CAF}"/>
               </a:ext>
             </a:extLst>
           </p:cNvPr>

</xml_diff>